<commit_message>
Updated some Xamarin Tour PPTX
</commit_message>
<xml_diff>
--- a/Xamarin Tour/02. Arquitectura Xamarin/Arquitectura en Aplicaciones Xamarin.pptx
+++ b/Xamarin Tour/02. Arquitectura Xamarin/Arquitectura en Aplicaciones Xamarin.pptx
@@ -5,7 +5,7 @@
     <p:sldMasterId id="2147483648" r:id="rId1"/>
   </p:sldMasterIdLst>
   <p:notesMasterIdLst>
-    <p:notesMasterId r:id="rId55"/>
+    <p:notesMasterId r:id="rId56"/>
   </p:notesMasterIdLst>
   <p:sldIdLst>
     <p:sldId id="264" r:id="rId2"/>
@@ -60,7 +60,8 @@
     <p:sldId id="374" r:id="rId51"/>
     <p:sldId id="375" r:id="rId52"/>
     <p:sldId id="370" r:id="rId53"/>
-    <p:sldId id="314" r:id="rId54"/>
+    <p:sldId id="376" r:id="rId54"/>
+    <p:sldId id="314" r:id="rId55"/>
   </p:sldIdLst>
   <p:sldSz cx="9144000" cy="6858000" type="screen4x3"/>
   <p:notesSz cx="6858000" cy="9144000"/>
@@ -290,7 +291,7 @@
           <a:p>
             <a:fld id="{7348EAAE-94BC-4003-A85E-1F5837E16DFB}" type="datetimeFigureOut">
               <a:rPr lang="es-ES" smtClean="0"/>
-              <a:t>26/01/2015</a:t>
+              <a:t>03/02/2015</a:t>
             </a:fld>
             <a:endParaRPr lang="es-ES"/>
           </a:p>
@@ -1572,7 +1573,7 @@
           <a:p>
             <a:fld id="{99593593-8839-4E61-A88E-A10B7ED6919B}" type="datetimeFigureOut">
               <a:rPr lang="es-ES" smtClean="0"/>
-              <a:t>26/01/2015</a:t>
+              <a:t>03/02/2015</a:t>
             </a:fld>
             <a:endParaRPr lang="es-ES"/>
           </a:p>
@@ -1742,7 +1743,7 @@
           <a:p>
             <a:fld id="{99593593-8839-4E61-A88E-A10B7ED6919B}" type="datetimeFigureOut">
               <a:rPr lang="es-ES" smtClean="0"/>
-              <a:t>26/01/2015</a:t>
+              <a:t>03/02/2015</a:t>
             </a:fld>
             <a:endParaRPr lang="es-ES"/>
           </a:p>
@@ -1922,7 +1923,7 @@
           <a:p>
             <a:fld id="{99593593-8839-4E61-A88E-A10B7ED6919B}" type="datetimeFigureOut">
               <a:rPr lang="es-ES" smtClean="0"/>
-              <a:t>26/01/2015</a:t>
+              <a:t>03/02/2015</a:t>
             </a:fld>
             <a:endParaRPr lang="es-ES"/>
           </a:p>
@@ -2185,7 +2186,7 @@
           <a:p>
             <a:fld id="{6DD3B76A-C5DE-4B9A-BEAE-BBF0DC17AAA8}" type="datetime1">
               <a:rPr lang="en-US" smtClean="0"/>
-              <a:t>1/26/2015</a:t>
+              <a:t>2/3/2015</a:t>
             </a:fld>
             <a:endParaRPr lang="en-US" dirty="0"/>
           </a:p>
@@ -2379,7 +2380,7 @@
           <a:p>
             <a:fld id="{99593593-8839-4E61-A88E-A10B7ED6919B}" type="datetimeFigureOut">
               <a:rPr lang="es-ES" smtClean="0"/>
-              <a:t>26/01/2015</a:t>
+              <a:t>03/02/2015</a:t>
             </a:fld>
             <a:endParaRPr lang="es-ES"/>
           </a:p>
@@ -2625,7 +2626,7 @@
           <a:p>
             <a:fld id="{99593593-8839-4E61-A88E-A10B7ED6919B}" type="datetimeFigureOut">
               <a:rPr lang="es-ES" smtClean="0"/>
-              <a:t>26/01/2015</a:t>
+              <a:t>03/02/2015</a:t>
             </a:fld>
             <a:endParaRPr lang="es-ES"/>
           </a:p>
@@ -2913,7 +2914,7 @@
           <a:p>
             <a:fld id="{99593593-8839-4E61-A88E-A10B7ED6919B}" type="datetimeFigureOut">
               <a:rPr lang="es-ES" smtClean="0"/>
-              <a:t>26/01/2015</a:t>
+              <a:t>03/02/2015</a:t>
             </a:fld>
             <a:endParaRPr lang="es-ES"/>
           </a:p>
@@ -3335,7 +3336,7 @@
           <a:p>
             <a:fld id="{99593593-8839-4E61-A88E-A10B7ED6919B}" type="datetimeFigureOut">
               <a:rPr lang="es-ES" smtClean="0"/>
-              <a:t>26/01/2015</a:t>
+              <a:t>03/02/2015</a:t>
             </a:fld>
             <a:endParaRPr lang="es-ES"/>
           </a:p>
@@ -3453,7 +3454,7 @@
           <a:p>
             <a:fld id="{99593593-8839-4E61-A88E-A10B7ED6919B}" type="datetimeFigureOut">
               <a:rPr lang="es-ES" smtClean="0"/>
-              <a:t>26/01/2015</a:t>
+              <a:t>03/02/2015</a:t>
             </a:fld>
             <a:endParaRPr lang="es-ES"/>
           </a:p>
@@ -3548,7 +3549,7 @@
           <a:p>
             <a:fld id="{99593593-8839-4E61-A88E-A10B7ED6919B}" type="datetimeFigureOut">
               <a:rPr lang="es-ES" smtClean="0"/>
-              <a:t>26/01/2015</a:t>
+              <a:t>03/02/2015</a:t>
             </a:fld>
             <a:endParaRPr lang="es-ES"/>
           </a:p>
@@ -3825,7 +3826,7 @@
           <a:p>
             <a:fld id="{99593593-8839-4E61-A88E-A10B7ED6919B}" type="datetimeFigureOut">
               <a:rPr lang="es-ES" smtClean="0"/>
-              <a:t>26/01/2015</a:t>
+              <a:t>03/02/2015</a:t>
             </a:fld>
             <a:endParaRPr lang="es-ES"/>
           </a:p>
@@ -4078,7 +4079,7 @@
           <a:p>
             <a:fld id="{99593593-8839-4E61-A88E-A10B7ED6919B}" type="datetimeFigureOut">
               <a:rPr lang="es-ES" smtClean="0"/>
-              <a:t>26/01/2015</a:t>
+              <a:t>03/02/2015</a:t>
             </a:fld>
             <a:endParaRPr lang="es-ES"/>
           </a:p>
@@ -4294,7 +4295,7 @@
           <a:p>
             <a:fld id="{99593593-8839-4E61-A88E-A10B7ED6919B}" type="datetimeFigureOut">
               <a:rPr lang="es-ES" smtClean="0"/>
-              <a:t>26/01/2015</a:t>
+              <a:t>03/02/2015</a:t>
             </a:fld>
             <a:endParaRPr lang="es-ES"/>
           </a:p>
@@ -35275,6 +35276,841 @@
 </file>
 
 <file path=ppt/slides/slide53.xml><?xml version="1.0" encoding="utf-8"?>
+<p:sld xmlns:a="http://schemas.openxmlformats.org/drawingml/2006/main" xmlns:r="http://schemas.openxmlformats.org/officeDocument/2006/relationships" xmlns:p="http://schemas.openxmlformats.org/presentationml/2006/main">
+  <p:cSld>
+    <p:spTree>
+      <p:nvGrpSpPr>
+        <p:cNvPr id="1" name=""/>
+        <p:cNvGrpSpPr/>
+        <p:nvPr/>
+      </p:nvGrpSpPr>
+      <p:grpSpPr>
+        <a:xfrm>
+          <a:off x="0" y="0"/>
+          <a:ext cx="0" cy="0"/>
+          <a:chOff x="0" y="0"/>
+          <a:chExt cx="0" cy="0"/>
+        </a:xfrm>
+      </p:grpSpPr>
+      <p:sp>
+        <p:nvSpPr>
+          <p:cNvPr id="46" name="Rectángulo 45"/>
+          <p:cNvSpPr/>
+          <p:nvPr/>
+        </p:nvSpPr>
+        <p:spPr>
+          <a:xfrm>
+            <a:off x="-1" y="-8013"/>
+            <a:ext cx="621023" cy="6885384"/>
+          </a:xfrm>
+          <a:prstGeom prst="rect">
+            <a:avLst/>
+          </a:prstGeom>
+          <a:solidFill>
+            <a:srgbClr val="027F98"/>
+          </a:solidFill>
+          <a:ln>
+            <a:noFill/>
+          </a:ln>
+        </p:spPr>
+        <p:style>
+          <a:lnRef idx="2">
+            <a:schemeClr val="accent1">
+              <a:shade val="50000"/>
+            </a:schemeClr>
+          </a:lnRef>
+          <a:fillRef idx="1">
+            <a:schemeClr val="accent1"/>
+          </a:fillRef>
+          <a:effectRef idx="0">
+            <a:schemeClr val="accent1"/>
+          </a:effectRef>
+          <a:fontRef idx="minor">
+            <a:schemeClr val="lt1"/>
+          </a:fontRef>
+        </p:style>
+        <p:txBody>
+          <a:bodyPr rtlCol="0" anchor="ctr"/>
+          <a:lstStyle/>
+          <a:p>
+            <a:pPr algn="ctr"/>
+            <a:endParaRPr lang="es-ES"/>
+          </a:p>
+        </p:txBody>
+      </p:sp>
+      <p:pic>
+        <p:nvPicPr>
+          <p:cNvPr id="9" name="Imagen 10"/>
+          <p:cNvPicPr>
+            <a:picLocks noChangeAspect="1"/>
+          </p:cNvPicPr>
+          <p:nvPr/>
+        </p:nvPicPr>
+        <p:blipFill>
+          <a:blip r:embed="rId2">
+            <a:extLst>
+              <a:ext uri="{28A0092B-C50C-407E-A947-70E740481C1C}">
+                <a14:useLocalDpi xmlns:a14="http://schemas.microsoft.com/office/drawing/2010/main" val="0"/>
+              </a:ext>
+            </a:extLst>
+          </a:blip>
+          <a:stretch>
+            <a:fillRect/>
+          </a:stretch>
+        </p:blipFill>
+        <p:spPr>
+          <a:xfrm>
+            <a:off x="6587573" y="281479"/>
+            <a:ext cx="1872208" cy="613754"/>
+          </a:xfrm>
+          <a:prstGeom prst="rect">
+            <a:avLst/>
+          </a:prstGeom>
+        </p:spPr>
+      </p:pic>
+      <p:sp>
+        <p:nvSpPr>
+          <p:cNvPr id="6" name="Title 2"/>
+          <p:cNvSpPr txBox="1">
+            <a:spLocks/>
+          </p:cNvSpPr>
+          <p:nvPr/>
+        </p:nvSpPr>
+        <p:spPr>
+          <a:xfrm>
+            <a:off x="1258981" y="4066148"/>
+            <a:ext cx="4078148" cy="485967"/>
+          </a:xfrm>
+          <a:prstGeom prst="rect">
+            <a:avLst/>
+          </a:prstGeom>
+        </p:spPr>
+        <p:txBody>
+          <a:bodyPr vert="horz" lIns="91440" tIns="45720" rIns="91440" bIns="45720" rtlCol="0" anchor="ctr">
+            <a:noAutofit/>
+          </a:bodyPr>
+          <a:lstStyle>
+            <a:lvl1pPr algn="ctr" defTabSz="914400" rtl="0" eaLnBrk="1" latinLnBrk="0" hangingPunct="1">
+              <a:spcBef>
+                <a:spcPct val="0"/>
+              </a:spcBef>
+              <a:buNone/>
+              <a:defRPr sz="4400" kern="1200">
+                <a:solidFill>
+                  <a:schemeClr val="tx1"/>
+                </a:solidFill>
+                <a:latin typeface="+mj-lt"/>
+                <a:ea typeface="+mj-ea"/>
+                <a:cs typeface="+mj-cs"/>
+              </a:defRPr>
+            </a:lvl1pPr>
+          </a:lstStyle>
+          <a:p>
+            <a:pPr algn="l"/>
+            <a:r>
+              <a:rPr lang="en-US" sz="3600" dirty="0" smtClean="0">
+                <a:solidFill>
+                  <a:schemeClr val="accent5">
+                    <a:lumMod val="50000"/>
+                  </a:schemeClr>
+                </a:solidFill>
+                <a:latin typeface="+mn-lt"/>
+              </a:rPr>
+              <a:t>Javier Suárez</a:t>
+            </a:r>
+            <a:endParaRPr lang="en-US" sz="3600" dirty="0">
+              <a:solidFill>
+                <a:schemeClr val="accent5">
+                  <a:lumMod val="50000"/>
+                </a:schemeClr>
+              </a:solidFill>
+              <a:latin typeface="+mn-lt"/>
+            </a:endParaRPr>
+          </a:p>
+        </p:txBody>
+      </p:sp>
+      <p:sp>
+        <p:nvSpPr>
+          <p:cNvPr id="7" name="Text Placeholder 4"/>
+          <p:cNvSpPr>
+            <a:spLocks noGrp="1"/>
+          </p:cNvSpPr>
+          <p:nvPr/>
+        </p:nvSpPr>
+        <p:spPr>
+          <a:xfrm>
+            <a:off x="1258981" y="4653136"/>
+            <a:ext cx="5328592" cy="1621641"/>
+          </a:xfrm>
+          <a:prstGeom prst="rect">
+            <a:avLst/>
+          </a:prstGeom>
+        </p:spPr>
+        <p:txBody>
+          <a:bodyPr vert="horz" lIns="91440" tIns="0" rIns="91440" bIns="45720" rtlCol="0">
+            <a:noAutofit/>
+          </a:bodyPr>
+          <a:lstStyle>
+            <a:lvl1pPr marL="0" indent="0" algn="l" defTabSz="914400" rtl="0" eaLnBrk="1" latinLnBrk="0" hangingPunct="1">
+              <a:spcBef>
+                <a:spcPct val="20000"/>
+              </a:spcBef>
+              <a:buFont typeface="Arial" pitchFamily="34" charset="0"/>
+              <a:buNone/>
+              <a:defRPr sz="2800" kern="1200">
+                <a:solidFill>
+                  <a:schemeClr val="bg1"/>
+                </a:solidFill>
+                <a:latin typeface="+mn-lt"/>
+                <a:ea typeface="+mn-ea"/>
+                <a:cs typeface="+mn-cs"/>
+              </a:defRPr>
+            </a:lvl1pPr>
+            <a:lvl2pPr marL="0" indent="0" algn="l" defTabSz="914400" rtl="0" eaLnBrk="1" latinLnBrk="0" hangingPunct="1">
+              <a:spcBef>
+                <a:spcPct val="20000"/>
+              </a:spcBef>
+              <a:buFont typeface="Arial" pitchFamily="34" charset="0"/>
+              <a:buNone/>
+              <a:defRPr sz="1600" kern="1200">
+                <a:solidFill>
+                  <a:schemeClr val="tx2"/>
+                </a:solidFill>
+                <a:latin typeface="+mn-lt"/>
+                <a:ea typeface="+mn-ea"/>
+                <a:cs typeface="+mn-cs"/>
+              </a:defRPr>
+            </a:lvl2pPr>
+            <a:lvl3pPr marL="447675" indent="-180975" algn="l" defTabSz="914400" rtl="0" eaLnBrk="1" latinLnBrk="0" hangingPunct="1">
+              <a:spcBef>
+                <a:spcPct val="20000"/>
+              </a:spcBef>
+              <a:buClr>
+                <a:schemeClr val="bg2"/>
+              </a:buClr>
+              <a:buSzPct val="120000"/>
+              <a:buFont typeface="Arial" pitchFamily="34" charset="0"/>
+              <a:buChar char="•"/>
+              <a:defRPr sz="1600" kern="1200">
+                <a:solidFill>
+                  <a:schemeClr val="tx2"/>
+                </a:solidFill>
+                <a:latin typeface="+mn-lt"/>
+                <a:ea typeface="+mn-ea"/>
+                <a:cs typeface="+mn-cs"/>
+              </a:defRPr>
+            </a:lvl3pPr>
+            <a:lvl4pPr marL="714375" indent="-266700" algn="l" defTabSz="914400" rtl="0" eaLnBrk="1" latinLnBrk="0" hangingPunct="1">
+              <a:spcBef>
+                <a:spcPct val="20000"/>
+              </a:spcBef>
+              <a:buClr>
+                <a:schemeClr val="bg2"/>
+              </a:buClr>
+              <a:buFont typeface="Arial" pitchFamily="34" charset="0"/>
+              <a:buChar char="–"/>
+              <a:defRPr sz="1600" kern="1200">
+                <a:solidFill>
+                  <a:schemeClr val="tx2"/>
+                </a:solidFill>
+                <a:latin typeface="+mn-lt"/>
+                <a:ea typeface="+mn-ea"/>
+                <a:cs typeface="+mn-cs"/>
+              </a:defRPr>
+            </a:lvl4pPr>
+            <a:lvl5pPr marL="990600" indent="-276225" algn="l" defTabSz="914400" rtl="0" eaLnBrk="1" latinLnBrk="0" hangingPunct="1">
+              <a:spcBef>
+                <a:spcPct val="20000"/>
+              </a:spcBef>
+              <a:buClr>
+                <a:schemeClr val="bg2"/>
+              </a:buClr>
+              <a:buFont typeface="Arial" pitchFamily="34" charset="0"/>
+              <a:buChar char="»"/>
+              <a:defRPr sz="1600" kern="1200">
+                <a:solidFill>
+                  <a:schemeClr val="tx2"/>
+                </a:solidFill>
+                <a:latin typeface="+mn-lt"/>
+                <a:ea typeface="+mn-ea"/>
+                <a:cs typeface="+mn-cs"/>
+              </a:defRPr>
+            </a:lvl5pPr>
+            <a:lvl6pPr marL="2514600" indent="-228600" algn="l" defTabSz="914400" rtl="0" eaLnBrk="1" latinLnBrk="0" hangingPunct="1">
+              <a:spcBef>
+                <a:spcPct val="20000"/>
+              </a:spcBef>
+              <a:buFont typeface="Arial" pitchFamily="34" charset="0"/>
+              <a:buChar char="•"/>
+              <a:defRPr sz="2000" kern="1200">
+                <a:solidFill>
+                  <a:schemeClr val="tx1"/>
+                </a:solidFill>
+                <a:latin typeface="+mn-lt"/>
+                <a:ea typeface="+mn-ea"/>
+                <a:cs typeface="+mn-cs"/>
+              </a:defRPr>
+            </a:lvl6pPr>
+            <a:lvl7pPr marL="2971800" indent="-228600" algn="l" defTabSz="914400" rtl="0" eaLnBrk="1" latinLnBrk="0" hangingPunct="1">
+              <a:spcBef>
+                <a:spcPct val="20000"/>
+              </a:spcBef>
+              <a:buFont typeface="Arial" pitchFamily="34" charset="0"/>
+              <a:buChar char="•"/>
+              <a:defRPr sz="2000" kern="1200">
+                <a:solidFill>
+                  <a:schemeClr val="tx1"/>
+                </a:solidFill>
+                <a:latin typeface="+mn-lt"/>
+                <a:ea typeface="+mn-ea"/>
+                <a:cs typeface="+mn-cs"/>
+              </a:defRPr>
+            </a:lvl7pPr>
+            <a:lvl8pPr marL="3429000" indent="-228600" algn="l" defTabSz="914400" rtl="0" eaLnBrk="1" latinLnBrk="0" hangingPunct="1">
+              <a:spcBef>
+                <a:spcPct val="20000"/>
+              </a:spcBef>
+              <a:buFont typeface="Arial" pitchFamily="34" charset="0"/>
+              <a:buChar char="•"/>
+              <a:defRPr sz="2000" kern="1200">
+                <a:solidFill>
+                  <a:schemeClr val="tx1"/>
+                </a:solidFill>
+                <a:latin typeface="+mn-lt"/>
+                <a:ea typeface="+mn-ea"/>
+                <a:cs typeface="+mn-cs"/>
+              </a:defRPr>
+            </a:lvl8pPr>
+            <a:lvl9pPr marL="3886200" indent="-228600" algn="l" defTabSz="914400" rtl="0" eaLnBrk="1" latinLnBrk="0" hangingPunct="1">
+              <a:spcBef>
+                <a:spcPct val="20000"/>
+              </a:spcBef>
+              <a:buFont typeface="Arial" pitchFamily="34" charset="0"/>
+              <a:buChar char="•"/>
+              <a:defRPr sz="2000" kern="1200">
+                <a:solidFill>
+                  <a:schemeClr val="tx1"/>
+                </a:solidFill>
+                <a:latin typeface="+mn-lt"/>
+                <a:ea typeface="+mn-ea"/>
+                <a:cs typeface="+mn-cs"/>
+              </a:defRPr>
+            </a:lvl9pPr>
+          </a:lstStyle>
+          <a:p>
+            <a:r>
+              <a:rPr lang="en-US" sz="1800" dirty="0" smtClean="0">
+                <a:solidFill>
+                  <a:schemeClr val="bg2">
+                    <a:lumMod val="25000"/>
+                  </a:schemeClr>
+                </a:solidFill>
+              </a:rPr>
+              <a:t>Microsoft MVP Windows Platform Development</a:t>
+            </a:r>
+          </a:p>
+          <a:p>
+            <a:endParaRPr lang="en-US" sz="1800" dirty="0">
+              <a:solidFill>
+                <a:schemeClr val="bg2">
+                  <a:lumMod val="25000"/>
+                </a:schemeClr>
+              </a:solidFill>
+            </a:endParaRPr>
+          </a:p>
+          <a:p>
+            <a:pPr marL="285750" indent="-285750">
+              <a:buFont typeface="Arial" panose="020B0604020202020204" pitchFamily="34" charset="0"/>
+              <a:buChar char="•"/>
+            </a:pPr>
+            <a:r>
+              <a:rPr lang="en-US" sz="1800" dirty="0" smtClean="0">
+                <a:solidFill>
+                  <a:schemeClr val="bg2">
+                    <a:lumMod val="25000"/>
+                  </a:schemeClr>
+                </a:solidFill>
+              </a:rPr>
+              <a:t>Blog</a:t>
+            </a:r>
+            <a:r>
+              <a:rPr lang="en-US" sz="1800" dirty="0">
+                <a:solidFill>
+                  <a:schemeClr val="bg2">
+                    <a:lumMod val="25000"/>
+                  </a:schemeClr>
+                </a:solidFill>
+              </a:rPr>
+              <a:t>: </a:t>
+            </a:r>
+            <a:r>
+              <a:rPr lang="en-US" sz="1800" dirty="0">
+                <a:solidFill>
+                  <a:schemeClr val="bg2">
+                    <a:lumMod val="25000"/>
+                  </a:schemeClr>
+                </a:solidFill>
+                <a:hlinkClick r:id="rId3"/>
+              </a:rPr>
+              <a:t>http://</a:t>
+            </a:r>
+            <a:r>
+              <a:rPr lang="en-US" sz="1800" dirty="0" smtClean="0">
+                <a:solidFill>
+                  <a:schemeClr val="bg2">
+                    <a:lumMod val="25000"/>
+                  </a:schemeClr>
+                </a:solidFill>
+                <a:hlinkClick r:id="rId3"/>
+              </a:rPr>
+              <a:t>geeks.ms/blogs/jsuarez</a:t>
+            </a:r>
+            <a:endParaRPr lang="en-US" sz="1800" dirty="0">
+              <a:solidFill>
+                <a:schemeClr val="bg2">
+                  <a:lumMod val="25000"/>
+                </a:schemeClr>
+              </a:solidFill>
+            </a:endParaRPr>
+          </a:p>
+          <a:p>
+            <a:pPr marL="285750" indent="-285750">
+              <a:buFont typeface="Arial" panose="020B0604020202020204" pitchFamily="34" charset="0"/>
+              <a:buChar char="•"/>
+            </a:pPr>
+            <a:r>
+              <a:rPr lang="en-US" sz="1800" dirty="0" smtClean="0">
+                <a:solidFill>
+                  <a:schemeClr val="bg2">
+                    <a:lumMod val="25000"/>
+                  </a:schemeClr>
+                </a:solidFill>
+              </a:rPr>
+              <a:t>Email: </a:t>
+            </a:r>
+            <a:r>
+              <a:rPr lang="en-US" sz="1800" dirty="0" smtClean="0">
+                <a:solidFill>
+                  <a:schemeClr val="bg2">
+                    <a:lumMod val="25000"/>
+                  </a:schemeClr>
+                </a:solidFill>
+                <a:hlinkClick r:id="rId4"/>
+              </a:rPr>
+              <a:t>javiersuarezruiz@hotmail.com</a:t>
+            </a:r>
+            <a:endParaRPr lang="en-US" sz="1800" dirty="0" smtClean="0">
+              <a:solidFill>
+                <a:schemeClr val="bg2">
+                  <a:lumMod val="25000"/>
+                </a:schemeClr>
+              </a:solidFill>
+            </a:endParaRPr>
+          </a:p>
+          <a:p>
+            <a:pPr marL="285750" indent="-285750">
+              <a:buFont typeface="Arial" panose="020B0604020202020204" pitchFamily="34" charset="0"/>
+              <a:buChar char="•"/>
+            </a:pPr>
+            <a:r>
+              <a:rPr lang="en-US" sz="1800" dirty="0" smtClean="0">
+                <a:solidFill>
+                  <a:schemeClr val="bg2">
+                    <a:lumMod val="25000"/>
+                  </a:schemeClr>
+                </a:solidFill>
+              </a:rPr>
+              <a:t>Twitter: @</a:t>
+            </a:r>
+            <a:r>
+              <a:rPr lang="en-US" sz="1800" dirty="0" err="1" smtClean="0">
+                <a:solidFill>
+                  <a:schemeClr val="bg2">
+                    <a:lumMod val="25000"/>
+                  </a:schemeClr>
+                </a:solidFill>
+              </a:rPr>
+              <a:t>jsuarezruiz</a:t>
+            </a:r>
+            <a:endParaRPr lang="en-US" sz="1800" dirty="0" smtClean="0">
+              <a:solidFill>
+                <a:schemeClr val="bg2">
+                  <a:lumMod val="25000"/>
+                </a:schemeClr>
+              </a:solidFill>
+            </a:endParaRPr>
+          </a:p>
+          <a:p>
+            <a:endParaRPr lang="en-US" sz="2400" dirty="0" smtClean="0">
+              <a:solidFill>
+                <a:schemeClr val="accent1"/>
+              </a:solidFill>
+            </a:endParaRPr>
+          </a:p>
+        </p:txBody>
+      </p:sp>
+      <p:pic>
+        <p:nvPicPr>
+          <p:cNvPr id="8" name="Imagen 7"/>
+          <p:cNvPicPr>
+            <a:picLocks noChangeAspect="1"/>
+          </p:cNvPicPr>
+          <p:nvPr/>
+        </p:nvPicPr>
+        <p:blipFill>
+          <a:blip r:embed="rId5">
+            <a:extLst>
+              <a:ext uri="{28A0092B-C50C-407E-A947-70E740481C1C}">
+                <a14:useLocalDpi xmlns:a14="http://schemas.microsoft.com/office/drawing/2010/main" val="0"/>
+              </a:ext>
+            </a:extLst>
+          </a:blip>
+          <a:stretch>
+            <a:fillRect/>
+          </a:stretch>
+        </p:blipFill>
+        <p:spPr>
+          <a:xfrm>
+            <a:off x="6437661" y="4066148"/>
+            <a:ext cx="1981737" cy="2134871"/>
+          </a:xfrm>
+          <a:prstGeom prst="rect">
+            <a:avLst/>
+          </a:prstGeom>
+        </p:spPr>
+      </p:pic>
+      <p:pic>
+        <p:nvPicPr>
+          <p:cNvPr id="10" name="Imagen 9"/>
+          <p:cNvPicPr>
+            <a:picLocks noChangeAspect="1"/>
+          </p:cNvPicPr>
+          <p:nvPr/>
+        </p:nvPicPr>
+        <p:blipFill>
+          <a:blip r:embed="rId6" cstate="print">
+            <a:extLst>
+              <a:ext uri="{28A0092B-C50C-407E-A947-70E740481C1C}">
+                <a14:useLocalDpi xmlns:a14="http://schemas.microsoft.com/office/drawing/2010/main" val="0"/>
+              </a:ext>
+            </a:extLst>
+          </a:blip>
+          <a:stretch>
+            <a:fillRect/>
+          </a:stretch>
+        </p:blipFill>
+        <p:spPr>
+          <a:xfrm>
+            <a:off x="7862021" y="5326366"/>
+            <a:ext cx="557377" cy="874653"/>
+          </a:xfrm>
+          <a:prstGeom prst="rect">
+            <a:avLst/>
+          </a:prstGeom>
+        </p:spPr>
+      </p:pic>
+      <p:sp>
+        <p:nvSpPr>
+          <p:cNvPr id="11" name="Title 2"/>
+          <p:cNvSpPr txBox="1">
+            <a:spLocks/>
+          </p:cNvSpPr>
+          <p:nvPr/>
+        </p:nvSpPr>
+        <p:spPr>
+          <a:xfrm>
+            <a:off x="2934926" y="1916832"/>
+            <a:ext cx="3502735" cy="950858"/>
+          </a:xfrm>
+          <a:prstGeom prst="rect">
+            <a:avLst/>
+          </a:prstGeom>
+        </p:spPr>
+        <p:txBody>
+          <a:bodyPr vert="horz" lIns="91440" tIns="45720" rIns="91440" bIns="45720" rtlCol="0" anchor="ctr">
+            <a:noAutofit/>
+          </a:bodyPr>
+          <a:lstStyle>
+            <a:lvl1pPr algn="ctr" defTabSz="914400" rtl="0" eaLnBrk="1" latinLnBrk="0" hangingPunct="1">
+              <a:spcBef>
+                <a:spcPct val="0"/>
+              </a:spcBef>
+              <a:buNone/>
+              <a:defRPr sz="4400" kern="1200">
+                <a:solidFill>
+                  <a:schemeClr val="tx1"/>
+                </a:solidFill>
+                <a:latin typeface="+mj-lt"/>
+                <a:ea typeface="+mj-ea"/>
+                <a:cs typeface="+mj-cs"/>
+              </a:defRPr>
+            </a:lvl1pPr>
+          </a:lstStyle>
+          <a:p>
+            <a:pPr algn="l"/>
+            <a:r>
+              <a:rPr lang="en-US" sz="7200" dirty="0" smtClean="0">
+                <a:solidFill>
+                  <a:schemeClr val="accent5">
+                    <a:lumMod val="50000"/>
+                  </a:schemeClr>
+                </a:solidFill>
+                <a:latin typeface="+mn-lt"/>
+              </a:rPr>
+              <a:t>GRACIAS</a:t>
+            </a:r>
+            <a:endParaRPr lang="en-US" sz="7200" dirty="0">
+              <a:solidFill>
+                <a:schemeClr val="accent5">
+                  <a:lumMod val="50000"/>
+                </a:schemeClr>
+              </a:solidFill>
+              <a:latin typeface="+mn-lt"/>
+            </a:endParaRPr>
+          </a:p>
+        </p:txBody>
+      </p:sp>
+    </p:spTree>
+    <p:extLst>
+      <p:ext uri="{BB962C8B-B14F-4D97-AF65-F5344CB8AC3E}">
+        <p14:creationId xmlns:p14="http://schemas.microsoft.com/office/powerpoint/2010/main" val="2890683024"/>
+      </p:ext>
+    </p:extLst>
+  </p:cSld>
+  <p:clrMapOvr>
+    <a:masterClrMapping/>
+  </p:clrMapOvr>
+  <p:timing>
+    <p:tnLst>
+      <p:par>
+        <p:cTn id="1" dur="indefinite" restart="never" nodeType="tmRoot">
+          <p:childTnLst>
+            <p:seq concurrent="1" nextAc="seek">
+              <p:cTn id="2" dur="indefinite" nodeType="mainSeq">
+                <p:childTnLst>
+                  <p:par>
+                    <p:cTn id="3" fill="hold">
+                      <p:stCondLst>
+                        <p:cond delay="indefinite"/>
+                        <p:cond evt="onBegin" delay="0">
+                          <p:tn val="2"/>
+                        </p:cond>
+                      </p:stCondLst>
+                      <p:childTnLst>
+                        <p:par>
+                          <p:cTn id="4" fill="hold">
+                            <p:stCondLst>
+                              <p:cond delay="0"/>
+                            </p:stCondLst>
+                            <p:childTnLst>
+                              <p:par>
+                                <p:cTn id="5" presetID="1" presetClass="entr" presetSubtype="0" fill="hold" grpId="0" nodeType="afterEffect">
+                                  <p:stCondLst>
+                                    <p:cond delay="0"/>
+                                  </p:stCondLst>
+                                  <p:childTnLst>
+                                    <p:set>
+                                      <p:cBhvr>
+                                        <p:cTn id="6" dur="1" fill="hold">
+                                          <p:stCondLst>
+                                            <p:cond delay="0"/>
+                                          </p:stCondLst>
+                                        </p:cTn>
+                                        <p:tgtEl>
+                                          <p:spTgt spid="6"/>
+                                        </p:tgtEl>
+                                        <p:attrNameLst>
+                                          <p:attrName>style.visibility</p:attrName>
+                                        </p:attrNameLst>
+                                      </p:cBhvr>
+                                      <p:to>
+                                        <p:strVal val="visible"/>
+                                      </p:to>
+                                    </p:set>
+                                  </p:childTnLst>
+                                </p:cTn>
+                              </p:par>
+                            </p:childTnLst>
+                          </p:cTn>
+                        </p:par>
+                        <p:par>
+                          <p:cTn id="7" fill="hold">
+                            <p:stCondLst>
+                              <p:cond delay="0"/>
+                            </p:stCondLst>
+                            <p:childTnLst>
+                              <p:par>
+                                <p:cTn id="8" presetID="1" presetClass="entr" presetSubtype="0" fill="hold" grpId="0" nodeType="afterEffect">
+                                  <p:stCondLst>
+                                    <p:cond delay="0"/>
+                                  </p:stCondLst>
+                                  <p:childTnLst>
+                                    <p:set>
+                                      <p:cBhvr>
+                                        <p:cTn id="9" dur="1" fill="hold">
+                                          <p:stCondLst>
+                                            <p:cond delay="0"/>
+                                          </p:stCondLst>
+                                        </p:cTn>
+                                        <p:tgtEl>
+                                          <p:spTgt spid="7"/>
+                                        </p:tgtEl>
+                                        <p:attrNameLst>
+                                          <p:attrName>style.visibility</p:attrName>
+                                        </p:attrNameLst>
+                                      </p:cBhvr>
+                                      <p:to>
+                                        <p:strVal val="visible"/>
+                                      </p:to>
+                                    </p:set>
+                                  </p:childTnLst>
+                                </p:cTn>
+                              </p:par>
+                            </p:childTnLst>
+                          </p:cTn>
+                        </p:par>
+                        <p:par>
+                          <p:cTn id="10" fill="hold">
+                            <p:stCondLst>
+                              <p:cond delay="0"/>
+                            </p:stCondLst>
+                            <p:childTnLst>
+                              <p:par>
+                                <p:cTn id="11" presetID="1" presetClass="entr" presetSubtype="0" fill="hold" nodeType="afterEffect">
+                                  <p:stCondLst>
+                                    <p:cond delay="0"/>
+                                  </p:stCondLst>
+                                  <p:childTnLst>
+                                    <p:set>
+                                      <p:cBhvr>
+                                        <p:cTn id="12" dur="1" fill="hold">
+                                          <p:stCondLst>
+                                            <p:cond delay="0"/>
+                                          </p:stCondLst>
+                                        </p:cTn>
+                                        <p:tgtEl>
+                                          <p:spTgt spid="8"/>
+                                        </p:tgtEl>
+                                        <p:attrNameLst>
+                                          <p:attrName>style.visibility</p:attrName>
+                                        </p:attrNameLst>
+                                      </p:cBhvr>
+                                      <p:to>
+                                        <p:strVal val="visible"/>
+                                      </p:to>
+                                    </p:set>
+                                  </p:childTnLst>
+                                </p:cTn>
+                              </p:par>
+                            </p:childTnLst>
+                          </p:cTn>
+                        </p:par>
+                        <p:par>
+                          <p:cTn id="13" fill="hold">
+                            <p:stCondLst>
+                              <p:cond delay="0"/>
+                            </p:stCondLst>
+                            <p:childTnLst>
+                              <p:par>
+                                <p:cTn id="14" presetID="1" presetClass="entr" presetSubtype="0" fill="hold" nodeType="afterEffect">
+                                  <p:stCondLst>
+                                    <p:cond delay="0"/>
+                                  </p:stCondLst>
+                                  <p:childTnLst>
+                                    <p:set>
+                                      <p:cBhvr>
+                                        <p:cTn id="15" dur="1" fill="hold">
+                                          <p:stCondLst>
+                                            <p:cond delay="0"/>
+                                          </p:stCondLst>
+                                        </p:cTn>
+                                        <p:tgtEl>
+                                          <p:spTgt spid="10"/>
+                                        </p:tgtEl>
+                                        <p:attrNameLst>
+                                          <p:attrName>style.visibility</p:attrName>
+                                        </p:attrNameLst>
+                                      </p:cBhvr>
+                                      <p:to>
+                                        <p:strVal val="visible"/>
+                                      </p:to>
+                                    </p:set>
+                                  </p:childTnLst>
+                                </p:cTn>
+                              </p:par>
+                            </p:childTnLst>
+                          </p:cTn>
+                        </p:par>
+                        <p:par>
+                          <p:cTn id="16" fill="hold">
+                            <p:stCondLst>
+                              <p:cond delay="0"/>
+                            </p:stCondLst>
+                            <p:childTnLst>
+                              <p:par>
+                                <p:cTn id="17" presetID="1" presetClass="entr" presetSubtype="0" fill="hold" grpId="0" nodeType="afterEffect">
+                                  <p:stCondLst>
+                                    <p:cond delay="0"/>
+                                  </p:stCondLst>
+                                  <p:childTnLst>
+                                    <p:set>
+                                      <p:cBhvr>
+                                        <p:cTn id="18" dur="1" fill="hold">
+                                          <p:stCondLst>
+                                            <p:cond delay="0"/>
+                                          </p:stCondLst>
+                                        </p:cTn>
+                                        <p:tgtEl>
+                                          <p:spTgt spid="11"/>
+                                        </p:tgtEl>
+                                        <p:attrNameLst>
+                                          <p:attrName>style.visibility</p:attrName>
+                                        </p:attrNameLst>
+                                      </p:cBhvr>
+                                      <p:to>
+                                        <p:strVal val="visible"/>
+                                      </p:to>
+                                    </p:set>
+                                  </p:childTnLst>
+                                </p:cTn>
+                              </p:par>
+                            </p:childTnLst>
+                          </p:cTn>
+                        </p:par>
+                      </p:childTnLst>
+                    </p:cTn>
+                  </p:par>
+                </p:childTnLst>
+              </p:cTn>
+              <p:prevCondLst>
+                <p:cond evt="onPrev" delay="0">
+                  <p:tgtEl>
+                    <p:sldTgt/>
+                  </p:tgtEl>
+                </p:cond>
+              </p:prevCondLst>
+              <p:nextCondLst>
+                <p:cond evt="onNext" delay="0">
+                  <p:tgtEl>
+                    <p:sldTgt/>
+                  </p:tgtEl>
+                </p:cond>
+              </p:nextCondLst>
+            </p:seq>
+          </p:childTnLst>
+        </p:cTn>
+      </p:par>
+    </p:tnLst>
+    <p:bldLst>
+      <p:bldP spid="6" grpId="0"/>
+      <p:bldP spid="7" grpId="0"/>
+      <p:bldP spid="11" grpId="0"/>
+    </p:bldLst>
+  </p:timing>
+</p:sld>
+</file>
+
+<file path=ppt/slides/slide54.xml><?xml version="1.0" encoding="utf-8"?>
 <p:sld xmlns:a="http://schemas.openxmlformats.org/drawingml/2006/main" xmlns:r="http://schemas.openxmlformats.org/officeDocument/2006/relationships" xmlns:p="http://schemas.openxmlformats.org/presentationml/2006/main">
   <p:cSld>
     <p:spTree>

</xml_diff>